<commit_message>
add new slide with jellyfish
</commit_message>
<xml_diff>
--- a/gryzg.pptx
+++ b/gryzg.pptx
@@ -6,6 +6,7 @@
   </p:sldMasterIdLst>
   <p:sldIdLst>
     <p:sldId id="256" r:id="rId2"/>
+    <p:sldId id="257" r:id="rId3"/>
   </p:sldIdLst>
   <p:sldSz cx="9144000" cy="6858000" type="screen4x3"/>
   <p:notesSz cx="6858000" cy="9144000"/>
@@ -3119,6 +3120,73 @@
           <a:prstGeom prst="rect">
             <a:avLst/>
           </a:prstGeom>
+        </p:spPr>
+      </p:pic>
+    </p:spTree>
+  </p:cSld>
+  <p:clrMapOvr>
+    <a:masterClrMapping/>
+  </p:clrMapOvr>
+</p:sld>
+</file>
+
+<file path=ppt/slides/slide2.xml><?xml version="1.0" encoding="utf-8"?>
+<p:sld xmlns:a="http://schemas.openxmlformats.org/drawingml/2006/main" xmlns:r="http://schemas.openxmlformats.org/officeDocument/2006/relationships" xmlns:p="http://schemas.openxmlformats.org/presentationml/2006/main">
+  <p:cSld>
+    <p:spTree>
+      <p:nvGrpSpPr>
+        <p:cNvPr id="1" name=""/>
+        <p:cNvGrpSpPr/>
+        <p:nvPr/>
+      </p:nvGrpSpPr>
+      <p:grpSpPr>
+        <a:xfrm>
+          <a:off x="0" y="0"/>
+          <a:ext cx="0" cy="0"/>
+          <a:chOff x="0" y="0"/>
+          <a:chExt cx="0" cy="0"/>
+        </a:xfrm>
+      </p:grpSpPr>
+      <p:sp>
+        <p:nvSpPr>
+          <p:cNvPr id="2" name="Заголовок 1"/>
+          <p:cNvSpPr>
+            <a:spLocks noGrp="1"/>
+          </p:cNvSpPr>
+          <p:nvPr>
+            <p:ph type="title"/>
+          </p:nvPr>
+        </p:nvSpPr>
+        <p:spPr/>
+        <p:txBody>
+          <a:bodyPr/>
+          <a:lstStyle/>
+          <a:p>
+            <a:endParaRPr lang="ru-RU"/>
+          </a:p>
+        </p:txBody>
+      </p:sp>
+      <p:pic>
+        <p:nvPicPr>
+          <p:cNvPr id="4" name="Содержимое 3" descr="Jellyfish.jpg"/>
+          <p:cNvPicPr>
+            <a:picLocks noGrp="1" noChangeAspect="1"/>
+          </p:cNvPicPr>
+          <p:nvPr>
+            <p:ph idx="1"/>
+          </p:nvPr>
+        </p:nvPicPr>
+        <p:blipFill>
+          <a:blip r:embed="rId2" cstate="print"/>
+          <a:stretch>
+            <a:fillRect/>
+          </a:stretch>
+        </p:blipFill>
+        <p:spPr>
+          <a:xfrm>
+            <a:off x="1691680" y="980728"/>
+            <a:ext cx="6034617" cy="4525963"/>
+          </a:xfrm>
         </p:spPr>
       </p:pic>
     </p:spTree>

</xml_diff>